<commit_message>
Add more ad images and update tracking
Signed-off-by: Steve Cassidy <steve.cassidy@mq.edu.au>
</commit_message>
<xml_diff>
--- a/public/images/ad-images.pptx
+++ b/public/images/ad-images.pptx
@@ -6,7 +6,11 @@
   </p:sldMasterIdLst>
   <p:sldIdLst>
     <p:sldId id="256" r:id="rId2"/>
-    <p:sldId id="257" r:id="rId3"/>
+    <p:sldId id="259" r:id="rId3"/>
+    <p:sldId id="257" r:id="rId4"/>
+    <p:sldId id="258" r:id="rId5"/>
+    <p:sldId id="260" r:id="rId6"/>
+    <p:sldId id="261" r:id="rId7"/>
   </p:sldIdLst>
   <p:sldSz cx="1800225" cy="1800225"/>
   <p:notesSz cx="6858000" cy="9144000"/>
@@ -105,6 +109,11 @@
       </a:defRPr>
     </a:lvl9pPr>
   </p:defaultTextStyle>
+  <p:extLst>
+    <p:ext uri="{EFAFB233-063F-42B5-8137-9DF3F51BA10A}">
+      <p15:sldGuideLst xmlns:p15="http://schemas.microsoft.com/office/powerpoint/2012/main"/>
+    </p:ext>
+  </p:extLst>
 </p:presentation>
 </file>
 
@@ -239,7 +248,7 @@
           <a:p>
             <a:fld id="{3477E290-58E3-6D4D-9041-3FBE044D2094}" type="datetimeFigureOut">
               <a:rPr lang="en-US" smtClean="0"/>
-              <a:t>1/23/23</a:t>
+              <a:t>2/26/23</a:t>
             </a:fld>
             <a:endParaRPr lang="en-US"/>
           </a:p>
@@ -409,7 +418,7 @@
           <a:p>
             <a:fld id="{3477E290-58E3-6D4D-9041-3FBE044D2094}" type="datetimeFigureOut">
               <a:rPr lang="en-US" smtClean="0"/>
-              <a:t>1/23/23</a:t>
+              <a:t>2/26/23</a:t>
             </a:fld>
             <a:endParaRPr lang="en-US"/>
           </a:p>
@@ -589,7 +598,7 @@
           <a:p>
             <a:fld id="{3477E290-58E3-6D4D-9041-3FBE044D2094}" type="datetimeFigureOut">
               <a:rPr lang="en-US" smtClean="0"/>
-              <a:t>1/23/23</a:t>
+              <a:t>2/26/23</a:t>
             </a:fld>
             <a:endParaRPr lang="en-US"/>
           </a:p>
@@ -759,7 +768,7 @@
           <a:p>
             <a:fld id="{3477E290-58E3-6D4D-9041-3FBE044D2094}" type="datetimeFigureOut">
               <a:rPr lang="en-US" smtClean="0"/>
-              <a:t>1/23/23</a:t>
+              <a:t>2/26/23</a:t>
             </a:fld>
             <a:endParaRPr lang="en-US"/>
           </a:p>
@@ -1003,7 +1012,7 @@
           <a:p>
             <a:fld id="{3477E290-58E3-6D4D-9041-3FBE044D2094}" type="datetimeFigureOut">
               <a:rPr lang="en-US" smtClean="0"/>
-              <a:t>1/23/23</a:t>
+              <a:t>2/26/23</a:t>
             </a:fld>
             <a:endParaRPr lang="en-US"/>
           </a:p>
@@ -1235,7 +1244,7 @@
           <a:p>
             <a:fld id="{3477E290-58E3-6D4D-9041-3FBE044D2094}" type="datetimeFigureOut">
               <a:rPr lang="en-US" smtClean="0"/>
-              <a:t>1/23/23</a:t>
+              <a:t>2/26/23</a:t>
             </a:fld>
             <a:endParaRPr lang="en-US"/>
           </a:p>
@@ -1602,7 +1611,7 @@
           <a:p>
             <a:fld id="{3477E290-58E3-6D4D-9041-3FBE044D2094}" type="datetimeFigureOut">
               <a:rPr lang="en-US" smtClean="0"/>
-              <a:t>1/23/23</a:t>
+              <a:t>2/26/23</a:t>
             </a:fld>
             <a:endParaRPr lang="en-US"/>
           </a:p>
@@ -1720,7 +1729,7 @@
           <a:p>
             <a:fld id="{3477E290-58E3-6D4D-9041-3FBE044D2094}" type="datetimeFigureOut">
               <a:rPr lang="en-US" smtClean="0"/>
-              <a:t>1/23/23</a:t>
+              <a:t>2/26/23</a:t>
             </a:fld>
             <a:endParaRPr lang="en-US"/>
           </a:p>
@@ -1815,7 +1824,7 @@
           <a:p>
             <a:fld id="{3477E290-58E3-6D4D-9041-3FBE044D2094}" type="datetimeFigureOut">
               <a:rPr lang="en-US" smtClean="0"/>
-              <a:t>1/23/23</a:t>
+              <a:t>2/26/23</a:t>
             </a:fld>
             <a:endParaRPr lang="en-US"/>
           </a:p>
@@ -2092,7 +2101,7 @@
           <a:p>
             <a:fld id="{3477E290-58E3-6D4D-9041-3FBE044D2094}" type="datetimeFigureOut">
               <a:rPr lang="en-US" smtClean="0"/>
-              <a:t>1/23/23</a:t>
+              <a:t>2/26/23</a:t>
             </a:fld>
             <a:endParaRPr lang="en-US"/>
           </a:p>
@@ -2349,7 +2358,7 @@
           <a:p>
             <a:fld id="{3477E290-58E3-6D4D-9041-3FBE044D2094}" type="datetimeFigureOut">
               <a:rPr lang="en-US" smtClean="0"/>
-              <a:t>1/23/23</a:t>
+              <a:t>2/26/23</a:t>
             </a:fld>
             <a:endParaRPr lang="en-US"/>
           </a:p>
@@ -2562,7 +2571,7 @@
           <a:p>
             <a:fld id="{3477E290-58E3-6D4D-9041-3FBE044D2094}" type="datetimeFigureOut">
               <a:rPr lang="en-US" smtClean="0"/>
-              <a:t>1/23/23</a:t>
+              <a:t>2/26/23</a:t>
             </a:fld>
             <a:endParaRPr lang="en-US"/>
           </a:p>
@@ -3192,9 +3201,9 @@
             <a:avLst/>
           </a:prstGeom>
           <a:solidFill>
-            <a:schemeClr val="accent6">
-              <a:lumMod val="60000"/>
-              <a:lumOff val="40000"/>
+            <a:schemeClr val="accent4">
+              <a:lumMod val="40000"/>
+              <a:lumOff val="60000"/>
             </a:schemeClr>
           </a:solidFill>
         </p:spPr>
@@ -3238,7 +3247,7 @@
         <p:spPr>
           <a:xfrm>
             <a:off x="231775" y="158750"/>
-            <a:ext cx="1253805" cy="369332"/>
+            <a:ext cx="1242200" cy="369332"/>
           </a:xfrm>
           <a:prstGeom prst="rect">
             <a:avLst/>
@@ -3253,7 +3262,7 @@
           <a:p>
             <a:r>
               <a:rPr lang="en-US" b="1" dirty="0"/>
-              <a:t>COMP3120</a:t>
+              <a:t>COMP2110</a:t>
             </a:r>
           </a:p>
         </p:txBody>
@@ -3273,7 +3282,7 @@
         <p:spPr>
           <a:xfrm>
             <a:off x="248382" y="397277"/>
-            <a:ext cx="1120948" cy="461665"/>
+            <a:ext cx="1212127" cy="276999"/>
           </a:xfrm>
           <a:prstGeom prst="rect">
             <a:avLst/>
@@ -3288,14 +3297,7 @@
           <a:p>
             <a:r>
               <a:rPr lang="en-US" sz="1200" dirty="0"/>
-              <a:t>Advanced Web</a:t>
-            </a:r>
-            <a:br>
-              <a:rPr lang="en-US" sz="1200" dirty="0"/>
-            </a:br>
-            <a:r>
-              <a:rPr lang="en-US" sz="1200" dirty="0"/>
-              <a:t>Development</a:t>
+              <a:t>Web Technology</a:t>
             </a:r>
           </a:p>
         </p:txBody>
@@ -3314,8 +3316,8 @@
         </p:nvSpPr>
         <p:spPr>
           <a:xfrm>
-            <a:off x="789314" y="912803"/>
-            <a:ext cx="943592" cy="461665"/>
+            <a:off x="488013" y="912803"/>
+            <a:ext cx="1244893" cy="461665"/>
           </a:xfrm>
           <a:prstGeom prst="rect">
             <a:avLst/>
@@ -3331,6 +3333,208 @@
             <a:pPr algn="r"/>
             <a:r>
               <a:rPr lang="en-US" sz="1200" dirty="0"/>
+              <a:t>Master the Web!</a:t>
+            </a:r>
+          </a:p>
+          <a:p>
+            <a:pPr algn="r"/>
+            <a:r>
+              <a:rPr lang="en-US" sz="1200" dirty="0"/>
+              <a:t>Build it yourself!</a:t>
+            </a:r>
+          </a:p>
+        </p:txBody>
+      </p:sp>
+    </p:spTree>
+    <p:extLst>
+      <p:ext uri="{BB962C8B-B14F-4D97-AF65-F5344CB8AC3E}">
+        <p14:creationId xmlns:p14="http://schemas.microsoft.com/office/powerpoint/2010/main" val="1519270692"/>
+      </p:ext>
+    </p:extLst>
+  </p:cSld>
+  <p:clrMapOvr>
+    <a:masterClrMapping/>
+  </p:clrMapOvr>
+</p:sld>
+</file>
+
+<file path=ppt/slides/slide3.xml><?xml version="1.0" encoding="utf-8"?>
+<p:sld xmlns:a="http://schemas.openxmlformats.org/drawingml/2006/main" xmlns:r="http://schemas.openxmlformats.org/officeDocument/2006/relationships" xmlns:p="http://schemas.openxmlformats.org/presentationml/2006/main">
+  <p:cSld>
+    <p:spTree>
+      <p:nvGrpSpPr>
+        <p:cNvPr id="1" name=""/>
+        <p:cNvGrpSpPr/>
+        <p:nvPr/>
+      </p:nvGrpSpPr>
+      <p:grpSpPr>
+        <a:xfrm>
+          <a:off x="0" y="0"/>
+          <a:ext cx="0" cy="0"/>
+          <a:chOff x="0" y="0"/>
+          <a:chExt cx="0" cy="0"/>
+        </a:xfrm>
+      </p:grpSpPr>
+      <p:sp>
+        <p:nvSpPr>
+          <p:cNvPr id="9" name="Rectangle 8">
+            <a:extLst>
+              <a:ext uri="{FF2B5EF4-FFF2-40B4-BE49-F238E27FC236}">
+                <a16:creationId xmlns:a16="http://schemas.microsoft.com/office/drawing/2014/main" id="{0EF484E8-E091-4963-FD0C-587D4AFCBCCB}"/>
+              </a:ext>
+            </a:extLst>
+          </p:cNvPr>
+          <p:cNvSpPr/>
+          <p:nvPr/>
+        </p:nvSpPr>
+        <p:spPr>
+          <a:xfrm>
+            <a:off x="0" y="0"/>
+            <a:ext cx="1800225" cy="1800225"/>
+          </a:xfrm>
+          <a:prstGeom prst="rect">
+            <a:avLst/>
+          </a:prstGeom>
+          <a:solidFill>
+            <a:schemeClr val="accent6">
+              <a:lumMod val="60000"/>
+              <a:lumOff val="40000"/>
+            </a:schemeClr>
+          </a:solidFill>
+        </p:spPr>
+        <p:style>
+          <a:lnRef idx="2">
+            <a:schemeClr val="accent1">
+              <a:shade val="50000"/>
+            </a:schemeClr>
+          </a:lnRef>
+          <a:fillRef idx="1">
+            <a:schemeClr val="accent1"/>
+          </a:fillRef>
+          <a:effectRef idx="0">
+            <a:schemeClr val="accent1"/>
+          </a:effectRef>
+          <a:fontRef idx="minor">
+            <a:schemeClr val="lt1"/>
+          </a:fontRef>
+        </p:style>
+        <p:txBody>
+          <a:bodyPr rtlCol="0" anchor="ctr"/>
+          <a:lstStyle/>
+          <a:p>
+            <a:pPr algn="ctr"/>
+            <a:endParaRPr lang="en-US"/>
+          </a:p>
+        </p:txBody>
+      </p:sp>
+      <p:sp>
+        <p:nvSpPr>
+          <p:cNvPr id="4" name="TextBox 3">
+            <a:extLst>
+              <a:ext uri="{FF2B5EF4-FFF2-40B4-BE49-F238E27FC236}">
+                <a16:creationId xmlns:a16="http://schemas.microsoft.com/office/drawing/2014/main" id="{5920D3C8-1142-E656-5FFB-551523082211}"/>
+              </a:ext>
+            </a:extLst>
+          </p:cNvPr>
+          <p:cNvSpPr txBox="1"/>
+          <p:nvPr/>
+        </p:nvSpPr>
+        <p:spPr>
+          <a:xfrm>
+            <a:off x="231775" y="158750"/>
+            <a:ext cx="1253805" cy="369332"/>
+          </a:xfrm>
+          <a:prstGeom prst="rect">
+            <a:avLst/>
+          </a:prstGeom>
+          <a:noFill/>
+        </p:spPr>
+        <p:txBody>
+          <a:bodyPr wrap="none" rtlCol="0">
+            <a:spAutoFit/>
+          </a:bodyPr>
+          <a:lstStyle/>
+          <a:p>
+            <a:r>
+              <a:rPr lang="en-US" b="1" dirty="0"/>
+              <a:t>COMP3120</a:t>
+            </a:r>
+          </a:p>
+        </p:txBody>
+      </p:sp>
+      <p:sp>
+        <p:nvSpPr>
+          <p:cNvPr id="5" name="TextBox 4">
+            <a:extLst>
+              <a:ext uri="{FF2B5EF4-FFF2-40B4-BE49-F238E27FC236}">
+                <a16:creationId xmlns:a16="http://schemas.microsoft.com/office/drawing/2014/main" id="{3B26EB72-8521-5525-A567-33C0527A781A}"/>
+              </a:ext>
+            </a:extLst>
+          </p:cNvPr>
+          <p:cNvSpPr txBox="1"/>
+          <p:nvPr/>
+        </p:nvSpPr>
+        <p:spPr>
+          <a:xfrm>
+            <a:off x="248382" y="397277"/>
+            <a:ext cx="1120948" cy="461665"/>
+          </a:xfrm>
+          <a:prstGeom prst="rect">
+            <a:avLst/>
+          </a:prstGeom>
+          <a:noFill/>
+        </p:spPr>
+        <p:txBody>
+          <a:bodyPr wrap="none" rtlCol="0">
+            <a:spAutoFit/>
+          </a:bodyPr>
+          <a:lstStyle/>
+          <a:p>
+            <a:r>
+              <a:rPr lang="en-US" sz="1200" dirty="0"/>
+              <a:t>Advanced Web</a:t>
+            </a:r>
+            <a:br>
+              <a:rPr lang="en-US" sz="1200" dirty="0"/>
+            </a:br>
+            <a:r>
+              <a:rPr lang="en-US" sz="1200" dirty="0"/>
+              <a:t>Development</a:t>
+            </a:r>
+          </a:p>
+        </p:txBody>
+      </p:sp>
+      <p:sp>
+        <p:nvSpPr>
+          <p:cNvPr id="8" name="TextBox 7">
+            <a:extLst>
+              <a:ext uri="{FF2B5EF4-FFF2-40B4-BE49-F238E27FC236}">
+                <a16:creationId xmlns:a16="http://schemas.microsoft.com/office/drawing/2014/main" id="{89FE1A38-354E-B4DF-9E92-C67F303A375F}"/>
+              </a:ext>
+            </a:extLst>
+          </p:cNvPr>
+          <p:cNvSpPr txBox="1"/>
+          <p:nvPr/>
+        </p:nvSpPr>
+        <p:spPr>
+          <a:xfrm>
+            <a:off x="789314" y="912803"/>
+            <a:ext cx="943592" cy="461665"/>
+          </a:xfrm>
+          <a:prstGeom prst="rect">
+            <a:avLst/>
+          </a:prstGeom>
+          <a:noFill/>
+        </p:spPr>
+        <p:txBody>
+          <a:bodyPr wrap="none" rtlCol="0">
+            <a:spAutoFit/>
+          </a:bodyPr>
+          <a:lstStyle/>
+          <a:p>
+            <a:pPr algn="r"/>
+            <a:r>
+              <a:rPr lang="en-US" sz="1200" dirty="0"/>
               <a:t>React to the</a:t>
             </a:r>
           </a:p>
@@ -3347,6 +3551,622 @@
     <p:extLst>
       <p:ext uri="{BB962C8B-B14F-4D97-AF65-F5344CB8AC3E}">
         <p14:creationId xmlns:p14="http://schemas.microsoft.com/office/powerpoint/2010/main" val="1440904712"/>
+      </p:ext>
+    </p:extLst>
+  </p:cSld>
+  <p:clrMapOvr>
+    <a:masterClrMapping/>
+  </p:clrMapOvr>
+</p:sld>
+</file>
+
+<file path=ppt/slides/slide4.xml><?xml version="1.0" encoding="utf-8"?>
+<p:sld xmlns:a="http://schemas.openxmlformats.org/drawingml/2006/main" xmlns:r="http://schemas.openxmlformats.org/officeDocument/2006/relationships" xmlns:p="http://schemas.openxmlformats.org/presentationml/2006/main">
+  <p:cSld>
+    <p:spTree>
+      <p:nvGrpSpPr>
+        <p:cNvPr id="1" name=""/>
+        <p:cNvGrpSpPr/>
+        <p:nvPr/>
+      </p:nvGrpSpPr>
+      <p:grpSpPr>
+        <a:xfrm>
+          <a:off x="0" y="0"/>
+          <a:ext cx="0" cy="0"/>
+          <a:chOff x="0" y="0"/>
+          <a:chExt cx="0" cy="0"/>
+        </a:xfrm>
+      </p:grpSpPr>
+      <p:sp>
+        <p:nvSpPr>
+          <p:cNvPr id="9" name="Rectangle 8">
+            <a:extLst>
+              <a:ext uri="{FF2B5EF4-FFF2-40B4-BE49-F238E27FC236}">
+                <a16:creationId xmlns:a16="http://schemas.microsoft.com/office/drawing/2014/main" id="{0EF484E8-E091-4963-FD0C-587D4AFCBCCB}"/>
+              </a:ext>
+            </a:extLst>
+          </p:cNvPr>
+          <p:cNvSpPr/>
+          <p:nvPr/>
+        </p:nvSpPr>
+        <p:spPr>
+          <a:xfrm>
+            <a:off x="0" y="0"/>
+            <a:ext cx="1800225" cy="1800225"/>
+          </a:xfrm>
+          <a:prstGeom prst="rect">
+            <a:avLst/>
+          </a:prstGeom>
+          <a:solidFill>
+            <a:schemeClr val="accent5"/>
+          </a:solidFill>
+        </p:spPr>
+        <p:style>
+          <a:lnRef idx="2">
+            <a:schemeClr val="accent1">
+              <a:shade val="50000"/>
+            </a:schemeClr>
+          </a:lnRef>
+          <a:fillRef idx="1">
+            <a:schemeClr val="accent1"/>
+          </a:fillRef>
+          <a:effectRef idx="0">
+            <a:schemeClr val="accent1"/>
+          </a:effectRef>
+          <a:fontRef idx="minor">
+            <a:schemeClr val="lt1"/>
+          </a:fontRef>
+        </p:style>
+        <p:txBody>
+          <a:bodyPr rtlCol="0" anchor="ctr"/>
+          <a:lstStyle/>
+          <a:p>
+            <a:pPr algn="ctr"/>
+            <a:endParaRPr lang="en-US"/>
+          </a:p>
+        </p:txBody>
+      </p:sp>
+      <p:sp>
+        <p:nvSpPr>
+          <p:cNvPr id="4" name="TextBox 3">
+            <a:extLst>
+              <a:ext uri="{FF2B5EF4-FFF2-40B4-BE49-F238E27FC236}">
+                <a16:creationId xmlns:a16="http://schemas.microsoft.com/office/drawing/2014/main" id="{5920D3C8-1142-E656-5FFB-551523082211}"/>
+              </a:ext>
+            </a:extLst>
+          </p:cNvPr>
+          <p:cNvSpPr txBox="1"/>
+          <p:nvPr/>
+        </p:nvSpPr>
+        <p:spPr>
+          <a:xfrm>
+            <a:off x="231775" y="158750"/>
+            <a:ext cx="1253805" cy="369332"/>
+          </a:xfrm>
+          <a:prstGeom prst="rect">
+            <a:avLst/>
+          </a:prstGeom>
+          <a:noFill/>
+        </p:spPr>
+        <p:txBody>
+          <a:bodyPr wrap="none" rtlCol="0">
+            <a:spAutoFit/>
+          </a:bodyPr>
+          <a:lstStyle/>
+          <a:p>
+            <a:r>
+              <a:rPr lang="en-US" b="1" dirty="0"/>
+              <a:t>COMP3120</a:t>
+            </a:r>
+          </a:p>
+        </p:txBody>
+      </p:sp>
+      <p:sp>
+        <p:nvSpPr>
+          <p:cNvPr id="5" name="TextBox 4">
+            <a:extLst>
+              <a:ext uri="{FF2B5EF4-FFF2-40B4-BE49-F238E27FC236}">
+                <a16:creationId xmlns:a16="http://schemas.microsoft.com/office/drawing/2014/main" id="{3B26EB72-8521-5525-A567-33C0527A781A}"/>
+              </a:ext>
+            </a:extLst>
+          </p:cNvPr>
+          <p:cNvSpPr txBox="1"/>
+          <p:nvPr/>
+        </p:nvSpPr>
+        <p:spPr>
+          <a:xfrm>
+            <a:off x="248382" y="397277"/>
+            <a:ext cx="1120948" cy="461665"/>
+          </a:xfrm>
+          <a:prstGeom prst="rect">
+            <a:avLst/>
+          </a:prstGeom>
+          <a:noFill/>
+        </p:spPr>
+        <p:txBody>
+          <a:bodyPr wrap="none" rtlCol="0">
+            <a:spAutoFit/>
+          </a:bodyPr>
+          <a:lstStyle/>
+          <a:p>
+            <a:r>
+              <a:rPr lang="en-US" sz="1200" dirty="0"/>
+              <a:t>Advanced Web</a:t>
+            </a:r>
+            <a:br>
+              <a:rPr lang="en-US" sz="1200" dirty="0"/>
+            </a:br>
+            <a:r>
+              <a:rPr lang="en-US" sz="1200" dirty="0"/>
+              <a:t>Development</a:t>
+            </a:r>
+          </a:p>
+        </p:txBody>
+      </p:sp>
+      <p:sp>
+        <p:nvSpPr>
+          <p:cNvPr id="8" name="TextBox 7">
+            <a:extLst>
+              <a:ext uri="{FF2B5EF4-FFF2-40B4-BE49-F238E27FC236}">
+                <a16:creationId xmlns:a16="http://schemas.microsoft.com/office/drawing/2014/main" id="{89FE1A38-354E-B4DF-9E92-C67F303A375F}"/>
+              </a:ext>
+            </a:extLst>
+          </p:cNvPr>
+          <p:cNvSpPr txBox="1"/>
+          <p:nvPr/>
+        </p:nvSpPr>
+        <p:spPr>
+          <a:xfrm>
+            <a:off x="939932" y="912803"/>
+            <a:ext cx="792974" cy="646331"/>
+          </a:xfrm>
+          <a:prstGeom prst="rect">
+            <a:avLst/>
+          </a:prstGeom>
+          <a:noFill/>
+        </p:spPr>
+        <p:txBody>
+          <a:bodyPr wrap="none" rtlCol="0">
+            <a:spAutoFit/>
+          </a:bodyPr>
+          <a:lstStyle/>
+          <a:p>
+            <a:pPr algn="r"/>
+            <a:r>
+              <a:rPr lang="en-US" sz="1200" dirty="0"/>
+              <a:t>Design it!</a:t>
+            </a:r>
+          </a:p>
+          <a:p>
+            <a:pPr algn="r"/>
+            <a:r>
+              <a:rPr lang="en-US" sz="1200" dirty="0"/>
+              <a:t>Build it!</a:t>
+            </a:r>
+          </a:p>
+          <a:p>
+            <a:pPr algn="r"/>
+            <a:r>
+              <a:rPr lang="en-US" sz="1200" dirty="0"/>
+              <a:t>Deploy it!</a:t>
+            </a:r>
+          </a:p>
+        </p:txBody>
+      </p:sp>
+    </p:spTree>
+    <p:extLst>
+      <p:ext uri="{BB962C8B-B14F-4D97-AF65-F5344CB8AC3E}">
+        <p14:creationId xmlns:p14="http://schemas.microsoft.com/office/powerpoint/2010/main" val="3909966811"/>
+      </p:ext>
+    </p:extLst>
+  </p:cSld>
+  <p:clrMapOvr>
+    <a:masterClrMapping/>
+  </p:clrMapOvr>
+</p:sld>
+</file>
+
+<file path=ppt/slides/slide5.xml><?xml version="1.0" encoding="utf-8"?>
+<p:sld xmlns:a="http://schemas.openxmlformats.org/drawingml/2006/main" xmlns:r="http://schemas.openxmlformats.org/officeDocument/2006/relationships" xmlns:p="http://schemas.openxmlformats.org/presentationml/2006/main">
+  <p:cSld>
+    <p:spTree>
+      <p:nvGrpSpPr>
+        <p:cNvPr id="1" name=""/>
+        <p:cNvGrpSpPr/>
+        <p:nvPr/>
+      </p:nvGrpSpPr>
+      <p:grpSpPr>
+        <a:xfrm>
+          <a:off x="0" y="0"/>
+          <a:ext cx="0" cy="0"/>
+          <a:chOff x="0" y="0"/>
+          <a:chExt cx="0" cy="0"/>
+        </a:xfrm>
+      </p:grpSpPr>
+      <p:sp>
+        <p:nvSpPr>
+          <p:cNvPr id="9" name="Rectangle 8">
+            <a:extLst>
+              <a:ext uri="{FF2B5EF4-FFF2-40B4-BE49-F238E27FC236}">
+                <a16:creationId xmlns:a16="http://schemas.microsoft.com/office/drawing/2014/main" id="{0EF484E8-E091-4963-FD0C-587D4AFCBCCB}"/>
+              </a:ext>
+            </a:extLst>
+          </p:cNvPr>
+          <p:cNvSpPr/>
+          <p:nvPr/>
+        </p:nvSpPr>
+        <p:spPr>
+          <a:xfrm>
+            <a:off x="0" y="0"/>
+            <a:ext cx="1800225" cy="1800225"/>
+          </a:xfrm>
+          <a:prstGeom prst="rect">
+            <a:avLst/>
+          </a:prstGeom>
+          <a:solidFill>
+            <a:srgbClr val="00B050"/>
+          </a:solidFill>
+        </p:spPr>
+        <p:style>
+          <a:lnRef idx="2">
+            <a:schemeClr val="accent1">
+              <a:shade val="50000"/>
+            </a:schemeClr>
+          </a:lnRef>
+          <a:fillRef idx="1">
+            <a:schemeClr val="accent1"/>
+          </a:fillRef>
+          <a:effectRef idx="0">
+            <a:schemeClr val="accent1"/>
+          </a:effectRef>
+          <a:fontRef idx="minor">
+            <a:schemeClr val="lt1"/>
+          </a:fontRef>
+        </p:style>
+        <p:txBody>
+          <a:bodyPr rtlCol="0" anchor="ctr"/>
+          <a:lstStyle/>
+          <a:p>
+            <a:pPr algn="ctr"/>
+            <a:endParaRPr lang="en-US"/>
+          </a:p>
+        </p:txBody>
+      </p:sp>
+      <p:sp>
+        <p:nvSpPr>
+          <p:cNvPr id="4" name="TextBox 3">
+            <a:extLst>
+              <a:ext uri="{FF2B5EF4-FFF2-40B4-BE49-F238E27FC236}">
+                <a16:creationId xmlns:a16="http://schemas.microsoft.com/office/drawing/2014/main" id="{5920D3C8-1142-E656-5FFB-551523082211}"/>
+              </a:ext>
+            </a:extLst>
+          </p:cNvPr>
+          <p:cNvSpPr txBox="1"/>
+          <p:nvPr/>
+        </p:nvSpPr>
+        <p:spPr>
+          <a:xfrm>
+            <a:off x="231775" y="158750"/>
+            <a:ext cx="1253805" cy="369332"/>
+          </a:xfrm>
+          <a:prstGeom prst="rect">
+            <a:avLst/>
+          </a:prstGeom>
+          <a:noFill/>
+        </p:spPr>
+        <p:txBody>
+          <a:bodyPr wrap="none" rtlCol="0">
+            <a:spAutoFit/>
+          </a:bodyPr>
+          <a:lstStyle/>
+          <a:p>
+            <a:r>
+              <a:rPr lang="en-US" b="1" dirty="0"/>
+              <a:t>COMP3130</a:t>
+            </a:r>
+          </a:p>
+        </p:txBody>
+      </p:sp>
+      <p:sp>
+        <p:nvSpPr>
+          <p:cNvPr id="5" name="TextBox 4">
+            <a:extLst>
+              <a:ext uri="{FF2B5EF4-FFF2-40B4-BE49-F238E27FC236}">
+                <a16:creationId xmlns:a16="http://schemas.microsoft.com/office/drawing/2014/main" id="{3B26EB72-8521-5525-A567-33C0527A781A}"/>
+              </a:ext>
+            </a:extLst>
+          </p:cNvPr>
+          <p:cNvSpPr txBox="1"/>
+          <p:nvPr/>
+        </p:nvSpPr>
+        <p:spPr>
+          <a:xfrm>
+            <a:off x="248382" y="397277"/>
+            <a:ext cx="1366593" cy="461665"/>
+          </a:xfrm>
+          <a:prstGeom prst="rect">
+            <a:avLst/>
+          </a:prstGeom>
+          <a:noFill/>
+        </p:spPr>
+        <p:txBody>
+          <a:bodyPr wrap="none" rtlCol="0">
+            <a:spAutoFit/>
+          </a:bodyPr>
+          <a:lstStyle/>
+          <a:p>
+            <a:r>
+              <a:rPr lang="en-US" sz="1200" dirty="0"/>
+              <a:t>Mobile Application</a:t>
+            </a:r>
+          </a:p>
+          <a:p>
+            <a:r>
+              <a:rPr lang="en-US" sz="1200" dirty="0"/>
+              <a:t>Development</a:t>
+            </a:r>
+          </a:p>
+        </p:txBody>
+      </p:sp>
+      <p:sp>
+        <p:nvSpPr>
+          <p:cNvPr id="8" name="TextBox 7">
+            <a:extLst>
+              <a:ext uri="{FF2B5EF4-FFF2-40B4-BE49-F238E27FC236}">
+                <a16:creationId xmlns:a16="http://schemas.microsoft.com/office/drawing/2014/main" id="{89FE1A38-354E-B4DF-9E92-C67F303A375F}"/>
+              </a:ext>
+            </a:extLst>
+          </p:cNvPr>
+          <p:cNvSpPr txBox="1"/>
+          <p:nvPr/>
+        </p:nvSpPr>
+        <p:spPr>
+          <a:xfrm>
+            <a:off x="1107414" y="912803"/>
+            <a:ext cx="625492" cy="646331"/>
+          </a:xfrm>
+          <a:prstGeom prst="rect">
+            <a:avLst/>
+          </a:prstGeom>
+          <a:noFill/>
+        </p:spPr>
+        <p:txBody>
+          <a:bodyPr wrap="none" rtlCol="0">
+            <a:spAutoFit/>
+          </a:bodyPr>
+          <a:lstStyle/>
+          <a:p>
+            <a:pPr algn="r"/>
+            <a:r>
+              <a:rPr lang="en-US" sz="1200" dirty="0"/>
+              <a:t>Make </a:t>
+            </a:r>
+          </a:p>
+          <a:p>
+            <a:pPr algn="r"/>
+            <a:r>
+              <a:rPr lang="en-US" sz="1200" dirty="0"/>
+              <a:t>it </a:t>
+            </a:r>
+          </a:p>
+          <a:p>
+            <a:pPr algn="r"/>
+            <a:r>
+              <a:rPr lang="en-US" sz="1200" dirty="0"/>
+              <a:t>Mobile</a:t>
+            </a:r>
+          </a:p>
+        </p:txBody>
+      </p:sp>
+    </p:spTree>
+    <p:extLst>
+      <p:ext uri="{BB962C8B-B14F-4D97-AF65-F5344CB8AC3E}">
+        <p14:creationId xmlns:p14="http://schemas.microsoft.com/office/powerpoint/2010/main" val="3340416201"/>
+      </p:ext>
+    </p:extLst>
+  </p:cSld>
+  <p:clrMapOvr>
+    <a:masterClrMapping/>
+  </p:clrMapOvr>
+</p:sld>
+</file>
+
+<file path=ppt/slides/slide6.xml><?xml version="1.0" encoding="utf-8"?>
+<p:sld xmlns:a="http://schemas.openxmlformats.org/drawingml/2006/main" xmlns:r="http://schemas.openxmlformats.org/officeDocument/2006/relationships" xmlns:p="http://schemas.openxmlformats.org/presentationml/2006/main">
+  <p:cSld>
+    <p:spTree>
+      <p:nvGrpSpPr>
+        <p:cNvPr id="1" name=""/>
+        <p:cNvGrpSpPr/>
+        <p:nvPr/>
+      </p:nvGrpSpPr>
+      <p:grpSpPr>
+        <a:xfrm>
+          <a:off x="0" y="0"/>
+          <a:ext cx="0" cy="0"/>
+          <a:chOff x="0" y="0"/>
+          <a:chExt cx="0" cy="0"/>
+        </a:xfrm>
+      </p:grpSpPr>
+      <p:sp>
+        <p:nvSpPr>
+          <p:cNvPr id="9" name="Rectangle 8">
+            <a:extLst>
+              <a:ext uri="{FF2B5EF4-FFF2-40B4-BE49-F238E27FC236}">
+                <a16:creationId xmlns:a16="http://schemas.microsoft.com/office/drawing/2014/main" id="{0EF484E8-E091-4963-FD0C-587D4AFCBCCB}"/>
+              </a:ext>
+            </a:extLst>
+          </p:cNvPr>
+          <p:cNvSpPr/>
+          <p:nvPr/>
+        </p:nvSpPr>
+        <p:spPr>
+          <a:xfrm>
+            <a:off x="0" y="0"/>
+            <a:ext cx="1800225" cy="1800225"/>
+          </a:xfrm>
+          <a:prstGeom prst="rect">
+            <a:avLst/>
+          </a:prstGeom>
+          <a:solidFill>
+            <a:srgbClr val="FFC000"/>
+          </a:solidFill>
+        </p:spPr>
+        <p:style>
+          <a:lnRef idx="2">
+            <a:schemeClr val="accent1">
+              <a:shade val="50000"/>
+            </a:schemeClr>
+          </a:lnRef>
+          <a:fillRef idx="1">
+            <a:schemeClr val="accent1"/>
+          </a:fillRef>
+          <a:effectRef idx="0">
+            <a:schemeClr val="accent1"/>
+          </a:effectRef>
+          <a:fontRef idx="minor">
+            <a:schemeClr val="lt1"/>
+          </a:fontRef>
+        </p:style>
+        <p:txBody>
+          <a:bodyPr rtlCol="0" anchor="ctr"/>
+          <a:lstStyle/>
+          <a:p>
+            <a:pPr algn="ctr"/>
+            <a:endParaRPr lang="en-US"/>
+          </a:p>
+        </p:txBody>
+      </p:sp>
+      <p:sp>
+        <p:nvSpPr>
+          <p:cNvPr id="4" name="TextBox 3">
+            <a:extLst>
+              <a:ext uri="{FF2B5EF4-FFF2-40B4-BE49-F238E27FC236}">
+                <a16:creationId xmlns:a16="http://schemas.microsoft.com/office/drawing/2014/main" id="{5920D3C8-1142-E656-5FFB-551523082211}"/>
+              </a:ext>
+            </a:extLst>
+          </p:cNvPr>
+          <p:cNvSpPr txBox="1"/>
+          <p:nvPr/>
+        </p:nvSpPr>
+        <p:spPr>
+          <a:xfrm>
+            <a:off x="231775" y="158750"/>
+            <a:ext cx="1253805" cy="369332"/>
+          </a:xfrm>
+          <a:prstGeom prst="rect">
+            <a:avLst/>
+          </a:prstGeom>
+          <a:noFill/>
+        </p:spPr>
+        <p:txBody>
+          <a:bodyPr wrap="none" rtlCol="0">
+            <a:spAutoFit/>
+          </a:bodyPr>
+          <a:lstStyle/>
+          <a:p>
+            <a:r>
+              <a:rPr lang="en-US" b="1" dirty="0"/>
+              <a:t>COMP3130</a:t>
+            </a:r>
+          </a:p>
+        </p:txBody>
+      </p:sp>
+      <p:sp>
+        <p:nvSpPr>
+          <p:cNvPr id="5" name="TextBox 4">
+            <a:extLst>
+              <a:ext uri="{FF2B5EF4-FFF2-40B4-BE49-F238E27FC236}">
+                <a16:creationId xmlns:a16="http://schemas.microsoft.com/office/drawing/2014/main" id="{3B26EB72-8521-5525-A567-33C0527A781A}"/>
+              </a:ext>
+            </a:extLst>
+          </p:cNvPr>
+          <p:cNvSpPr txBox="1"/>
+          <p:nvPr/>
+        </p:nvSpPr>
+        <p:spPr>
+          <a:xfrm>
+            <a:off x="248382" y="397277"/>
+            <a:ext cx="1366593" cy="461665"/>
+          </a:xfrm>
+          <a:prstGeom prst="rect">
+            <a:avLst/>
+          </a:prstGeom>
+          <a:noFill/>
+        </p:spPr>
+        <p:txBody>
+          <a:bodyPr wrap="none" rtlCol="0">
+            <a:spAutoFit/>
+          </a:bodyPr>
+          <a:lstStyle/>
+          <a:p>
+            <a:r>
+              <a:rPr lang="en-US" sz="1200" dirty="0"/>
+              <a:t>Mobile Application</a:t>
+            </a:r>
+          </a:p>
+          <a:p>
+            <a:r>
+              <a:rPr lang="en-US" sz="1200" dirty="0"/>
+              <a:t>Development</a:t>
+            </a:r>
+          </a:p>
+        </p:txBody>
+      </p:sp>
+      <p:sp>
+        <p:nvSpPr>
+          <p:cNvPr id="8" name="TextBox 7">
+            <a:extLst>
+              <a:ext uri="{FF2B5EF4-FFF2-40B4-BE49-F238E27FC236}">
+                <a16:creationId xmlns:a16="http://schemas.microsoft.com/office/drawing/2014/main" id="{89FE1A38-354E-B4DF-9E92-C67F303A375F}"/>
+              </a:ext>
+            </a:extLst>
+          </p:cNvPr>
+          <p:cNvSpPr txBox="1"/>
+          <p:nvPr/>
+        </p:nvSpPr>
+        <p:spPr>
+          <a:xfrm>
+            <a:off x="538541" y="912803"/>
+            <a:ext cx="1194365" cy="646331"/>
+          </a:xfrm>
+          <a:prstGeom prst="rect">
+            <a:avLst/>
+          </a:prstGeom>
+          <a:noFill/>
+        </p:spPr>
+        <p:txBody>
+          <a:bodyPr wrap="none" rtlCol="0">
+            <a:spAutoFit/>
+          </a:bodyPr>
+          <a:lstStyle/>
+          <a:p>
+            <a:pPr algn="r"/>
+            <a:r>
+              <a:rPr lang="en-US" sz="1200" dirty="0"/>
+              <a:t>Your key to</a:t>
+            </a:r>
+          </a:p>
+          <a:p>
+            <a:pPr algn="r"/>
+            <a:r>
+              <a:rPr lang="en-US" sz="1200" dirty="0"/>
+              <a:t>the next big app</a:t>
+            </a:r>
+          </a:p>
+          <a:p>
+            <a:pPr algn="r"/>
+            <a:r>
+              <a:rPr lang="en-US" sz="1200" dirty="0"/>
+              <a:t>experience</a:t>
+            </a:r>
+          </a:p>
+        </p:txBody>
+      </p:sp>
+    </p:spTree>
+    <p:extLst>
+      <p:ext uri="{BB962C8B-B14F-4D97-AF65-F5344CB8AC3E}">
+        <p14:creationId xmlns:p14="http://schemas.microsoft.com/office/powerpoint/2010/main" val="3291202617"/>
       </p:ext>
     </p:extLst>
   </p:cSld>

</xml_diff>